<commit_message>
added few more sections
</commit_message>
<xml_diff>
--- a/style-inventories/LEARN_Style_Audit.pptx
+++ b/style-inventories/LEARN_Style_Audit.pptx
@@ -32,6 +32,11 @@
     <p:sldId id="282" r:id="rId26"/>
     <p:sldId id="283" r:id="rId27"/>
     <p:sldId id="284" r:id="rId28"/>
+    <p:sldId id="285" r:id="rId29"/>
+    <p:sldId id="286" r:id="rId30"/>
+    <p:sldId id="287" r:id="rId31"/>
+    <p:sldId id="288" r:id="rId32"/>
+    <p:sldId id="289" r:id="rId33"/>
   </p:sldIdLst>
   <p:sldSz cx="9144000" cy="6858000" type="screen4x3"/>
   <p:notesSz cx="6858000" cy="9144000"/>
@@ -3144,25 +3149,6 @@
           </a:p>
         </p:txBody>
       </p:sp>
-      <p:sp>
-        <p:nvSpPr>
-          <p:cNvPr id="3" name="Subtitle 2"/>
-          <p:cNvSpPr>
-            <a:spLocks noGrp="1"/>
-          </p:cNvSpPr>
-          <p:nvPr>
-            <p:ph type="subTitle" idx="1"/>
-          </p:nvPr>
-        </p:nvSpPr>
-        <p:spPr/>
-        <p:txBody>
-          <a:bodyPr/>
-          <a:lstStyle/>
-          <a:p>
-            <a:endParaRPr lang="en-US"/>
-          </a:p>
-        </p:txBody>
-      </p:sp>
     </p:spTree>
     <p:extLst>
       <p:ext uri="{BB962C8B-B14F-4D97-AF65-F5344CB8AC3E}">
@@ -3216,25 +3202,6 @@
           </a:p>
         </p:txBody>
       </p:sp>
-      <p:sp>
-        <p:nvSpPr>
-          <p:cNvPr id="3" name="Subtitle 2"/>
-          <p:cNvSpPr>
-            <a:spLocks noGrp="1"/>
-          </p:cNvSpPr>
-          <p:nvPr>
-            <p:ph type="subTitle" idx="1"/>
-          </p:nvPr>
-        </p:nvSpPr>
-        <p:spPr/>
-        <p:txBody>
-          <a:bodyPr/>
-          <a:lstStyle/>
-          <a:p>
-            <a:endParaRPr lang="en-US"/>
-          </a:p>
-        </p:txBody>
-      </p:sp>
     </p:spTree>
     <p:extLst>
       <p:ext uri="{BB962C8B-B14F-4D97-AF65-F5344CB8AC3E}">
@@ -3327,15 +3294,7 @@
           <a:p>
             <a:r>
               <a:rPr lang="en-US" sz="1600" dirty="0" smtClean="0"/>
-              <a:t>Text – </a:t>
-            </a:r>
-            <a:r>
-              <a:rPr lang="en-US" sz="1600" dirty="0" smtClean="0"/>
-              <a:t>Open Sans 20px </a:t>
-            </a:r>
-            <a:r>
-              <a:rPr lang="en-US" sz="1600" dirty="0" smtClean="0"/>
-              <a:t>Bold #FFF</a:t>
+              <a:t>Text – Open Sans 20px Bold #FFF</a:t>
             </a:r>
             <a:endParaRPr lang="en-US" sz="1600" dirty="0"/>
           </a:p>
@@ -3365,23 +3324,11 @@
           <a:p>
             <a:r>
               <a:rPr lang="en-US" sz="1600" dirty="0" smtClean="0"/>
-              <a:t>Button Default – </a:t>
-            </a:r>
-            <a:r>
-              <a:rPr lang="en-US" sz="1600" dirty="0" smtClean="0"/>
-              <a:t>Open Sans 1.5em </a:t>
-            </a:r>
-            <a:r>
-              <a:rPr lang="en-US" sz="1600" dirty="0" smtClean="0"/>
-              <a:t>#FFF</a:t>
+              <a:t>Button Default – Open Sans 1.5em #FFF</a:t>
             </a:r>
             <a:r>
               <a:rPr lang="en-US" sz="1600" dirty="0"/>
-              <a:t>, Background #</a:t>
-            </a:r>
-            <a:r>
-              <a:rPr lang="en-US" sz="1600" dirty="0"/>
-              <a:t>0A5C87, </a:t>
+              <a:t>, Background #0A5C87, </a:t>
             </a:r>
             <a:r>
               <a:rPr lang="en-US" sz="1600" dirty="0" smtClean="0"/>
@@ -3667,25 +3614,6 @@
           </a:p>
         </p:txBody>
       </p:sp>
-      <p:sp>
-        <p:nvSpPr>
-          <p:cNvPr id="3" name="Subtitle 2"/>
-          <p:cNvSpPr>
-            <a:spLocks noGrp="1"/>
-          </p:cNvSpPr>
-          <p:nvPr>
-            <p:ph type="subTitle" idx="1"/>
-          </p:nvPr>
-        </p:nvSpPr>
-        <p:spPr/>
-        <p:txBody>
-          <a:bodyPr/>
-          <a:lstStyle/>
-          <a:p>
-            <a:endParaRPr lang="en-US"/>
-          </a:p>
-        </p:txBody>
-      </p:sp>
     </p:spTree>
     <p:extLst>
       <p:ext uri="{BB962C8B-B14F-4D97-AF65-F5344CB8AC3E}">
@@ -3740,15 +3668,7 @@
           <a:p>
             <a:r>
               <a:rPr lang="en-US" sz="1600" dirty="0" smtClean="0"/>
-              <a:t>H2 – </a:t>
-            </a:r>
-            <a:r>
-              <a:rPr lang="en-US" sz="1600" dirty="0" smtClean="0"/>
-              <a:t>Open Sans 20px </a:t>
-            </a:r>
-            <a:r>
-              <a:rPr lang="en-US" sz="1600" dirty="0" smtClean="0"/>
-              <a:t>Bold #FFF</a:t>
+              <a:t>H2 – Open Sans 20px Bold #FFF</a:t>
             </a:r>
             <a:endParaRPr lang="en-US" sz="1600" dirty="0"/>
           </a:p>
@@ -3778,15 +3698,7 @@
           <a:p>
             <a:r>
               <a:rPr lang="en-US" sz="1600" dirty="0" smtClean="0"/>
-              <a:t>Descriptor text – </a:t>
-            </a:r>
-            <a:r>
-              <a:rPr lang="en-US" sz="1600" dirty="0" smtClean="0"/>
-              <a:t>Open Sans 13px </a:t>
-            </a:r>
-            <a:r>
-              <a:rPr lang="en-US" sz="1600" dirty="0" smtClean="0"/>
-              <a:t>#FFF, line-height 17px </a:t>
+              <a:t>Descriptor text – Open Sans 13px #FFF, line-height 17px </a:t>
             </a:r>
             <a:endParaRPr lang="en-US" sz="1600" dirty="0"/>
           </a:p>
@@ -3830,15 +3742,7 @@
           <a:p>
             <a:r>
               <a:rPr lang="en-US" sz="1600" dirty="0" smtClean="0"/>
-              <a:t>Button </a:t>
-            </a:r>
-            <a:r>
-              <a:rPr lang="en-US" sz="1600" dirty="0" smtClean="0"/>
-              <a:t>– Open Sans </a:t>
-            </a:r>
-            <a:r>
-              <a:rPr lang="en-US" sz="1600" dirty="0" smtClean="0"/>
-              <a:t>16px Bold #FFF</a:t>
+              <a:t>Button – Open Sans 16px Bold #FFF</a:t>
             </a:r>
             <a:r>
               <a:rPr lang="en-US" sz="1600" dirty="0"/>
@@ -3882,11 +3786,7 @@
             </a:r>
             <a:r>
               <a:rPr lang="en-US" sz="1600" dirty="0"/>
-              <a:t>rollover – Background </a:t>
-            </a:r>
-            <a:r>
-              <a:rPr lang="en-US" sz="1600" dirty="0"/>
-              <a:t>#1295e8 </a:t>
+              <a:t>rollover – Background #1295e8 </a:t>
             </a:r>
           </a:p>
         </p:txBody>
@@ -4065,15 +3965,7 @@
           <a:p>
             <a:r>
               <a:rPr lang="en-US" sz="1600" dirty="0" smtClean="0"/>
-              <a:t>Form field text – </a:t>
-            </a:r>
-            <a:r>
-              <a:rPr lang="en-US" sz="1600" dirty="0" smtClean="0"/>
-              <a:t>Open Sans 16px </a:t>
-            </a:r>
-            <a:r>
-              <a:rPr lang="en-US" sz="1600" dirty="0" smtClean="0"/>
-              <a:t>#555</a:t>
+              <a:t>Form field text – Open Sans 16px #555</a:t>
             </a:r>
             <a:endParaRPr lang="en-US" sz="1600" dirty="0"/>
           </a:p>
@@ -4133,11 +4025,7 @@
           <a:p>
             <a:r>
               <a:rPr lang="en-US" sz="1600" dirty="0" smtClean="0"/>
-              <a:t>Footnote </a:t>
-            </a:r>
-            <a:r>
-              <a:rPr lang="en-US" sz="1600" dirty="0" smtClean="0"/>
-              <a:t>– Open Sans 10px #FFF, link 1px underline</a:t>
+              <a:t>Footnote – Open Sans 10px #FFF, link 1px underline</a:t>
             </a:r>
             <a:endParaRPr lang="en-US" sz="1600" dirty="0"/>
           </a:p>
@@ -4196,25 +4084,6 @@
           </a:p>
         </p:txBody>
       </p:sp>
-      <p:sp>
-        <p:nvSpPr>
-          <p:cNvPr id="3" name="Subtitle 2"/>
-          <p:cNvSpPr>
-            <a:spLocks noGrp="1"/>
-          </p:cNvSpPr>
-          <p:nvPr>
-            <p:ph type="subTitle" idx="1"/>
-          </p:nvPr>
-        </p:nvSpPr>
-        <p:spPr/>
-        <p:txBody>
-          <a:bodyPr/>
-          <a:lstStyle/>
-          <a:p>
-            <a:endParaRPr lang="en-US"/>
-          </a:p>
-        </p:txBody>
-      </p:sp>
     </p:spTree>
     <p:extLst>
       <p:ext uri="{BB962C8B-B14F-4D97-AF65-F5344CB8AC3E}">
@@ -4269,19 +4138,7 @@
           <a:p>
             <a:r>
               <a:rPr lang="en-US" sz="1600" dirty="0" smtClean="0"/>
-              <a:t>H2 – </a:t>
-            </a:r>
-            <a:r>
-              <a:rPr lang="en-US" sz="1600" dirty="0" smtClean="0"/>
-              <a:t>Open Sans 20px </a:t>
-            </a:r>
-            <a:r>
-              <a:rPr lang="en-US" sz="1600" dirty="0" smtClean="0"/>
-              <a:t>Bold #</a:t>
-            </a:r>
-            <a:r>
-              <a:rPr lang="en-US" sz="1600" dirty="0" smtClean="0"/>
-              <a:t>FFF, Rollover underline</a:t>
+              <a:t>H2 – Open Sans 20px Bold #FFF, Rollover underline</a:t>
             </a:r>
             <a:endParaRPr lang="en-US" sz="1600" dirty="0"/>
           </a:p>
@@ -4341,15 +4198,7 @@
           <a:p>
             <a:r>
               <a:rPr lang="en-US" sz="1600" dirty="0" smtClean="0"/>
-              <a:t>Date – </a:t>
-            </a:r>
-            <a:r>
-              <a:rPr lang="en-US" sz="1600" dirty="0" smtClean="0"/>
-              <a:t>Open Sans 13px </a:t>
-            </a:r>
-            <a:r>
-              <a:rPr lang="en-US" sz="1600" dirty="0" smtClean="0"/>
-              <a:t>Bold #FFF, line-height 17px, border-bottom 2px Solid #39C</a:t>
+              <a:t>Date – Open Sans 13px Bold #FFF, line-height 17px, border-bottom 2px Solid #39C</a:t>
             </a:r>
             <a:endParaRPr lang="en-US" sz="1600" dirty="0"/>
           </a:p>
@@ -4409,15 +4258,7 @@
           <a:p>
             <a:r>
               <a:rPr lang="en-US" sz="1600" dirty="0" smtClean="0"/>
-              <a:t>Title – </a:t>
-            </a:r>
-            <a:r>
-              <a:rPr lang="en-US" sz="1600" dirty="0" smtClean="0"/>
-              <a:t>Open Sans 13px </a:t>
-            </a:r>
-            <a:r>
-              <a:rPr lang="en-US" sz="1600" dirty="0" smtClean="0"/>
-              <a:t>Regular </a:t>
+              <a:t>Title – Open Sans 13px Regular </a:t>
             </a:r>
             <a:r>
               <a:rPr lang="en-US" sz="1600" dirty="0"/>
@@ -4557,11 +4398,7 @@
           <a:p>
             <a:r>
               <a:rPr lang="en-US" sz="1600" dirty="0" smtClean="0"/>
-              <a:t>Button </a:t>
-            </a:r>
-            <a:r>
-              <a:rPr lang="en-US" sz="1600" dirty="0" smtClean="0"/>
-              <a:t>Default – </a:t>
+              <a:t>Button Default – </a:t>
             </a:r>
             <a:r>
               <a:rPr lang="en-US" sz="1600" dirty="0"/>
@@ -4589,15 +4426,7 @@
           <a:p>
             <a:r>
               <a:rPr lang="en-US" sz="1600" dirty="0"/>
-              <a:t>Button </a:t>
-            </a:r>
-            <a:r>
-              <a:rPr lang="en-US" sz="1600" dirty="0"/>
-              <a:t>rollover – Background </a:t>
-            </a:r>
-            <a:r>
-              <a:rPr lang="en-US" sz="1600" dirty="0"/>
-              <a:t>#1295e8 </a:t>
+              <a:t>Button rollover – Background #1295e8 </a:t>
             </a:r>
           </a:p>
           <a:p>
@@ -4721,25 +4550,6 @@
           </a:p>
         </p:txBody>
       </p:sp>
-      <p:sp>
-        <p:nvSpPr>
-          <p:cNvPr id="3" name="Subtitle 2"/>
-          <p:cNvSpPr>
-            <a:spLocks noGrp="1"/>
-          </p:cNvSpPr>
-          <p:nvPr>
-            <p:ph type="subTitle" idx="1"/>
-          </p:nvPr>
-        </p:nvSpPr>
-        <p:spPr/>
-        <p:txBody>
-          <a:bodyPr/>
-          <a:lstStyle/>
-          <a:p>
-            <a:endParaRPr lang="en-US"/>
-          </a:p>
-        </p:txBody>
-      </p:sp>
     </p:spTree>
     <p:extLst>
       <p:ext uri="{BB962C8B-B14F-4D97-AF65-F5344CB8AC3E}">
@@ -4794,15 +4604,7 @@
           <a:p>
             <a:r>
               <a:rPr lang="en-US" sz="1600" dirty="0" smtClean="0"/>
-              <a:t>H1 </a:t>
-            </a:r>
-            <a:r>
-              <a:rPr lang="en-US" sz="1600" dirty="0" smtClean="0"/>
-              <a:t>– </a:t>
-            </a:r>
-            <a:r>
-              <a:rPr lang="en-US" sz="1600" dirty="0" smtClean="0"/>
-              <a:t>Bitter 36px Font-weight 400 #333, line-height 44px, letter-spacing normal</a:t>
+              <a:t>H1 – Bitter 36px Font-weight 400 #333, line-height 44px, letter-spacing normal</a:t>
             </a:r>
             <a:endParaRPr lang="en-US" sz="1600" dirty="0"/>
           </a:p>
@@ -4892,15 +4694,7 @@
           <a:p>
             <a:r>
               <a:rPr lang="en-US" sz="1600" dirty="0" smtClean="0"/>
-              <a:t>H1 </a:t>
-            </a:r>
-            <a:r>
-              <a:rPr lang="en-US" sz="1600" dirty="0" smtClean="0"/>
-              <a:t>– </a:t>
-            </a:r>
-            <a:r>
-              <a:rPr lang="en-US" sz="1600" dirty="0" smtClean="0"/>
-              <a:t>Bitter 22px Font-weight 400 #666, line-height 24px</a:t>
+              <a:t>H1 – Bitter 22px Font-weight 400 #666, line-height 24px</a:t>
             </a:r>
             <a:endParaRPr lang="en-US" sz="1600" dirty="0"/>
           </a:p>
@@ -4964,15 +4758,7 @@
             </a:r>
             <a:r>
               <a:rPr lang="en-US" sz="1600" dirty="0" smtClean="0"/>
-              <a:t> Tabs </a:t>
-            </a:r>
-            <a:r>
-              <a:rPr lang="en-US" sz="1600" dirty="0" smtClean="0"/>
-              <a:t>– </a:t>
-            </a:r>
-            <a:r>
-              <a:rPr lang="en-US" sz="1600" dirty="0" smtClean="0"/>
-              <a:t>Open Sans 16px Font-weight 400 #000, link #0C648C, background #</a:t>
+              <a:t> Tabs – Open Sans 16px Font-weight 400 #000, link #0C648C, background #</a:t>
             </a:r>
             <a:r>
               <a:rPr lang="en-US" sz="1600" dirty="0" err="1" smtClean="0"/>
@@ -5330,11 +5116,7 @@
             </a:r>
             <a:r>
               <a:rPr lang="en-US" sz="1600" dirty="0" smtClean="0"/>
-              <a:t>Open Sans 14px #CDEDFA font-weight normal, line-spacing 19px</a:t>
-            </a:r>
-            <a:r>
-              <a:rPr lang="en-US" sz="1600" dirty="0" smtClean="0"/>
-              <a:t>  </a:t>
+              <a:t>Open Sans 14px #CDEDFA font-weight normal, line-spacing 19px  </a:t>
             </a:r>
           </a:p>
           <a:p>
@@ -5553,7 +5335,6 @@
               <a:rPr lang="en-US" sz="1600" dirty="0" smtClean="0"/>
               <a:t>FAQ Question .answer – Open Sans 16px #666, line-height 24px</a:t>
             </a:r>
-            <a:endParaRPr lang="en-US" sz="1600" dirty="0" smtClean="0"/>
           </a:p>
         </p:txBody>
       </p:sp>
@@ -5736,25 +5517,6 @@
           </a:p>
         </p:txBody>
       </p:sp>
-      <p:sp>
-        <p:nvSpPr>
-          <p:cNvPr id="3" name="Subtitle 2"/>
-          <p:cNvSpPr>
-            <a:spLocks noGrp="1"/>
-          </p:cNvSpPr>
-          <p:nvPr>
-            <p:ph type="subTitle" idx="1"/>
-          </p:nvPr>
-        </p:nvSpPr>
-        <p:spPr/>
-        <p:txBody>
-          <a:bodyPr/>
-          <a:lstStyle/>
-          <a:p>
-            <a:endParaRPr lang="en-US"/>
-          </a:p>
-        </p:txBody>
-      </p:sp>
     </p:spTree>
     <p:extLst>
       <p:ext uri="{BB962C8B-B14F-4D97-AF65-F5344CB8AC3E}">
@@ -5819,15 +5581,7 @@
           <a:p>
             <a:r>
               <a:rPr lang="en-US" sz="1600" dirty="0" smtClean="0"/>
-              <a:t>H4 </a:t>
-            </a:r>
-            <a:r>
-              <a:rPr lang="en-US" sz="1600" dirty="0" smtClean="0"/>
-              <a:t>– </a:t>
-            </a:r>
-            <a:r>
-              <a:rPr lang="en-US" sz="1600" dirty="0" smtClean="0"/>
-              <a:t>Open Sans 16px Bold#333, line-height 24px</a:t>
+              <a:t>H4 – Open Sans 16px Bold#333, line-height 24px</a:t>
             </a:r>
           </a:p>
           <a:p>
@@ -5843,7 +5597,6 @@
               <a:rPr lang="en-US" sz="1600" dirty="0" smtClean="0"/>
               <a:t> Open Sans 16px normal, links #0C648C, Rollover underline</a:t>
             </a:r>
-            <a:endParaRPr lang="en-US" sz="1600" dirty="0" smtClean="0"/>
           </a:p>
           <a:p>
             <a:endParaRPr lang="en-US" sz="1600" dirty="0"/>
@@ -5960,25 +5713,6 @@
               <a:t>Blog</a:t>
             </a:r>
             <a:endParaRPr lang="en-US" dirty="0"/>
-          </a:p>
-        </p:txBody>
-      </p:sp>
-      <p:sp>
-        <p:nvSpPr>
-          <p:cNvPr id="3" name="Subtitle 2"/>
-          <p:cNvSpPr>
-            <a:spLocks noGrp="1"/>
-          </p:cNvSpPr>
-          <p:nvPr>
-            <p:ph type="subTitle" idx="1"/>
-          </p:nvPr>
-        </p:nvSpPr>
-        <p:spPr/>
-        <p:txBody>
-          <a:bodyPr/>
-          <a:lstStyle/>
-          <a:p>
-            <a:endParaRPr lang="en-US"/>
           </a:p>
         </p:txBody>
       </p:sp>
@@ -6066,15 +5800,7 @@
           <a:p>
             <a:r>
               <a:rPr lang="en-US" sz="1600" dirty="0" smtClean="0"/>
-              <a:t>H1 </a:t>
-            </a:r>
-            <a:r>
-              <a:rPr lang="en-US" sz="1600" dirty="0" smtClean="0"/>
-              <a:t>– </a:t>
-            </a:r>
-            <a:r>
-              <a:rPr lang="en-US" sz="1600" dirty="0" smtClean="0"/>
-              <a:t>Bitter 36px font-weight 400 #333, letter-spacing normal, line-height 44px</a:t>
+              <a:t>H1 – Bitter 36px font-weight 400 #333, letter-spacing normal, line-height 44px</a:t>
             </a:r>
           </a:p>
         </p:txBody>
@@ -6371,15 +6097,7 @@
           <a:p>
             <a:r>
               <a:rPr lang="en-US" sz="1600" dirty="0" smtClean="0"/>
-              <a:t>Button </a:t>
-            </a:r>
-            <a:r>
-              <a:rPr lang="en-US" sz="1600" dirty="0" smtClean="0"/>
-              <a:t>– </a:t>
-            </a:r>
-            <a:r>
-              <a:rPr lang="en-US" sz="1600" dirty="0" smtClean="0"/>
-              <a:t>Open Sans 16px font-weight 700 #0E70B4, Background #EEE, rollover #0E70B4</a:t>
+              <a:t>Button – Open Sans 16px font-weight 700 #0E70B4, Background #EEE, rollover #0E70B4</a:t>
             </a:r>
           </a:p>
         </p:txBody>
@@ -6459,6 +6177,36 @@
           </p:spPr>
         </p:pic>
       </p:grpSp>
+      <p:sp>
+        <p:nvSpPr>
+          <p:cNvPr id="14" name="TextBox 13"/>
+          <p:cNvSpPr txBox="1"/>
+          <p:nvPr/>
+        </p:nvSpPr>
+        <p:spPr>
+          <a:xfrm>
+            <a:off x="1043881" y="2882766"/>
+            <a:ext cx="7404953" cy="338554"/>
+          </a:xfrm>
+          <a:prstGeom prst="rect">
+            <a:avLst/>
+          </a:prstGeom>
+          <a:noFill/>
+        </p:spPr>
+        <p:txBody>
+          <a:bodyPr wrap="square" rtlCol="0">
+            <a:spAutoFit/>
+          </a:bodyPr>
+          <a:lstStyle/>
+          <a:p>
+            <a:r>
+              <a:rPr lang="en-US" sz="1600" dirty="0" smtClean="0"/>
+              <a:t>Content styling same as Explainer pages</a:t>
+            </a:r>
+            <a:endParaRPr lang="en-US" sz="1600" dirty="0"/>
+          </a:p>
+        </p:txBody>
+      </p:sp>
     </p:spTree>
     <p:extLst>
       <p:ext uri="{BB962C8B-B14F-4D97-AF65-F5344CB8AC3E}">
@@ -6512,25 +6260,6 @@
           </a:p>
         </p:txBody>
       </p:sp>
-      <p:sp>
-        <p:nvSpPr>
-          <p:cNvPr id="3" name="Subtitle 2"/>
-          <p:cNvSpPr>
-            <a:spLocks noGrp="1"/>
-          </p:cNvSpPr>
-          <p:nvPr>
-            <p:ph type="subTitle" idx="1"/>
-          </p:nvPr>
-        </p:nvSpPr>
-        <p:spPr/>
-        <p:txBody>
-          <a:bodyPr/>
-          <a:lstStyle/>
-          <a:p>
-            <a:endParaRPr lang="en-US"/>
-          </a:p>
-        </p:txBody>
-      </p:sp>
     </p:spTree>
     <p:extLst>
       <p:ext uri="{BB962C8B-B14F-4D97-AF65-F5344CB8AC3E}">
@@ -6585,15 +6314,7 @@
           <a:p>
             <a:r>
               <a:rPr lang="en-US" sz="1600" dirty="0" smtClean="0"/>
-              <a:t>H1 </a:t>
-            </a:r>
-            <a:r>
-              <a:rPr lang="en-US" sz="1600" dirty="0" smtClean="0"/>
-              <a:t>– </a:t>
-            </a:r>
-            <a:r>
-              <a:rPr lang="en-US" sz="1600" dirty="0" smtClean="0"/>
-              <a:t>Bitter 36px font-weight 400 #333, letter-spacing normal, line-height 44px</a:t>
+              <a:t>H1 – Bitter 36px font-weight 400 #333, letter-spacing normal, line-height 44px</a:t>
             </a:r>
           </a:p>
         </p:txBody>
@@ -6636,7 +6357,7 @@
         </p:nvSpPr>
         <p:spPr>
           <a:xfrm>
-            <a:off x="1045115" y="1685321"/>
+            <a:off x="1045115" y="1883130"/>
             <a:ext cx="7404953" cy="338554"/>
           </a:xfrm>
           <a:prstGeom prst="rect">
@@ -6652,15 +6373,7 @@
           <a:p>
             <a:r>
               <a:rPr lang="en-US" sz="1600" dirty="0" smtClean="0"/>
-              <a:t>H2 </a:t>
-            </a:r>
-            <a:r>
-              <a:rPr lang="en-US" sz="1600" dirty="0" smtClean="0"/>
-              <a:t>– </a:t>
-            </a:r>
-            <a:r>
-              <a:rPr lang="en-US" sz="1600" dirty="0" smtClean="0"/>
-              <a:t>Bitter 24px font-weight 400 #0C648C</a:t>
+              <a:t>H2 – Bitter 24px font-weight 400 #0C648C</a:t>
             </a:r>
             <a:r>
               <a:rPr lang="en-US" sz="1600" dirty="0"/>
@@ -6692,8 +6405,457 @@
         </p:blipFill>
         <p:spPr>
           <a:xfrm>
-            <a:off x="993525" y="2101556"/>
+            <a:off x="993525" y="2299365"/>
             <a:ext cx="5848474" cy="349163"/>
+          </a:xfrm>
+          <a:prstGeom prst="rect">
+            <a:avLst/>
+          </a:prstGeom>
+        </p:spPr>
+      </p:pic>
+      <p:pic>
+        <p:nvPicPr>
+          <p:cNvPr id="13" name="Picture 12" descr="List-wRollover-Sitemap.png"/>
+          <p:cNvPicPr>
+            <a:picLocks noChangeAspect="1"/>
+          </p:cNvPicPr>
+          <p:nvPr/>
+        </p:nvPicPr>
+        <p:blipFill>
+          <a:blip r:embed="rId4">
+            <a:extLst>
+              <a:ext uri="{28A0092B-C50C-407E-A947-70E740481C1C}">
+                <a14:useLocalDpi xmlns:a14="http://schemas.microsoft.com/office/drawing/2010/main" val="0"/>
+              </a:ext>
+            </a:extLst>
+          </a:blip>
+          <a:stretch>
+            <a:fillRect/>
+          </a:stretch>
+        </p:blipFill>
+        <p:spPr>
+          <a:xfrm>
+            <a:off x="993525" y="4622125"/>
+            <a:ext cx="2998118" cy="1946604"/>
+          </a:xfrm>
+          <a:prstGeom prst="rect">
+            <a:avLst/>
+          </a:prstGeom>
+        </p:spPr>
+      </p:pic>
+      <p:sp>
+        <p:nvSpPr>
+          <p:cNvPr id="14" name="TextBox 13"/>
+          <p:cNvSpPr txBox="1"/>
+          <p:nvPr/>
+        </p:nvSpPr>
+        <p:spPr>
+          <a:xfrm>
+            <a:off x="1045115" y="4196988"/>
+            <a:ext cx="7404953" cy="338554"/>
+          </a:xfrm>
+          <a:prstGeom prst="rect">
+            <a:avLst/>
+          </a:prstGeom>
+          <a:noFill/>
+        </p:spPr>
+        <p:txBody>
+          <a:bodyPr wrap="square" rtlCol="0">
+            <a:spAutoFit/>
+          </a:bodyPr>
+          <a:lstStyle/>
+          <a:p>
+            <a:r>
+              <a:rPr lang="en-US" sz="1600" dirty="0" smtClean="0"/>
+              <a:t>List – Open Sans 1.5em font-weight 400 #0C648C</a:t>
+            </a:r>
+            <a:r>
+              <a:rPr lang="en-US" sz="1600" dirty="0"/>
+              <a:t>, Rollover </a:t>
+            </a:r>
+            <a:r>
+              <a:rPr lang="en-US" sz="1600" dirty="0" smtClean="0"/>
+              <a:t>1px #</a:t>
+            </a:r>
+            <a:r>
+              <a:rPr lang="en-US" sz="1600" dirty="0"/>
+              <a:t>08425d </a:t>
+            </a:r>
+            <a:endParaRPr lang="en-US" sz="1600" dirty="0" smtClean="0"/>
+          </a:p>
+        </p:txBody>
+      </p:sp>
+      <p:pic>
+        <p:nvPicPr>
+          <p:cNvPr id="15" name="Picture 14" descr="H3-Sitemap.png"/>
+          <p:cNvPicPr>
+            <a:picLocks noChangeAspect="1"/>
+          </p:cNvPicPr>
+          <p:nvPr/>
+        </p:nvPicPr>
+        <p:blipFill>
+          <a:blip r:embed="rId5">
+            <a:extLst>
+              <a:ext uri="{28A0092B-C50C-407E-A947-70E740481C1C}">
+                <a14:useLocalDpi xmlns:a14="http://schemas.microsoft.com/office/drawing/2010/main" val="0"/>
+              </a:ext>
+            </a:extLst>
+          </a:blip>
+          <a:stretch>
+            <a:fillRect/>
+          </a:stretch>
+        </p:blipFill>
+        <p:spPr>
+          <a:xfrm>
+            <a:off x="941475" y="3518698"/>
+            <a:ext cx="1494497" cy="352867"/>
+          </a:xfrm>
+          <a:prstGeom prst="rect">
+            <a:avLst/>
+          </a:prstGeom>
+        </p:spPr>
+      </p:pic>
+      <p:sp>
+        <p:nvSpPr>
+          <p:cNvPr id="16" name="TextBox 15"/>
+          <p:cNvSpPr txBox="1"/>
+          <p:nvPr/>
+        </p:nvSpPr>
+        <p:spPr>
+          <a:xfrm>
+            <a:off x="1045115" y="3164220"/>
+            <a:ext cx="7404953" cy="338554"/>
+          </a:xfrm>
+          <a:prstGeom prst="rect">
+            <a:avLst/>
+          </a:prstGeom>
+          <a:noFill/>
+        </p:spPr>
+        <p:txBody>
+          <a:bodyPr wrap="square" rtlCol="0">
+            <a:spAutoFit/>
+          </a:bodyPr>
+          <a:lstStyle/>
+          <a:p>
+            <a:r>
+              <a:rPr lang="en-US" sz="1600" dirty="0" smtClean="0"/>
+              <a:t>H3 – Open Sans 16px font-weight 700 #333, Text-transform uppercase</a:t>
+            </a:r>
+          </a:p>
+        </p:txBody>
+      </p:sp>
+    </p:spTree>
+    <p:extLst>
+      <p:ext uri="{BB962C8B-B14F-4D97-AF65-F5344CB8AC3E}">
+        <p14:creationId xmlns:p14="http://schemas.microsoft.com/office/powerpoint/2010/main" val="2363415097"/>
+      </p:ext>
+    </p:extLst>
+  </p:cSld>
+  <p:clrMapOvr>
+    <a:masterClrMapping/>
+  </p:clrMapOvr>
+</p:sld>
+</file>
+
+<file path=ppt/slides/slide28.xml><?xml version="1.0" encoding="utf-8"?>
+<p:sld xmlns:a="http://schemas.openxmlformats.org/drawingml/2006/main" xmlns:r="http://schemas.openxmlformats.org/officeDocument/2006/relationships" xmlns:p="http://schemas.openxmlformats.org/presentationml/2006/main">
+  <p:cSld>
+    <p:spTree>
+      <p:nvGrpSpPr>
+        <p:cNvPr id="1" name=""/>
+        <p:cNvGrpSpPr/>
+        <p:nvPr/>
+      </p:nvGrpSpPr>
+      <p:grpSpPr>
+        <a:xfrm>
+          <a:off x="0" y="0"/>
+          <a:ext cx="0" cy="0"/>
+          <a:chOff x="0" y="0"/>
+          <a:chExt cx="0" cy="0"/>
+        </a:xfrm>
+      </p:grpSpPr>
+      <p:sp>
+        <p:nvSpPr>
+          <p:cNvPr id="2" name="Title 1"/>
+          <p:cNvSpPr>
+            <a:spLocks noGrp="1"/>
+          </p:cNvSpPr>
+          <p:nvPr>
+            <p:ph type="ctrTitle"/>
+          </p:nvPr>
+        </p:nvSpPr>
+        <p:spPr/>
+        <p:txBody>
+          <a:bodyPr/>
+          <a:lstStyle/>
+          <a:p>
+            <a:r>
+              <a:rPr lang="en-US" dirty="0" smtClean="0"/>
+              <a:t>Glossary</a:t>
+            </a:r>
+            <a:endParaRPr lang="en-US" dirty="0"/>
+          </a:p>
+        </p:txBody>
+      </p:sp>
+    </p:spTree>
+    <p:extLst>
+      <p:ext uri="{BB962C8B-B14F-4D97-AF65-F5344CB8AC3E}">
+        <p14:creationId xmlns:p14="http://schemas.microsoft.com/office/powerpoint/2010/main" val="1224314901"/>
+      </p:ext>
+    </p:extLst>
+  </p:cSld>
+  <p:clrMapOvr>
+    <a:masterClrMapping/>
+  </p:clrMapOvr>
+</p:sld>
+</file>
+
+<file path=ppt/slides/slide29.xml><?xml version="1.0" encoding="utf-8"?>
+<p:sld xmlns:a="http://schemas.openxmlformats.org/drawingml/2006/main" xmlns:r="http://schemas.openxmlformats.org/officeDocument/2006/relationships" xmlns:p="http://schemas.openxmlformats.org/presentationml/2006/main">
+  <p:cSld>
+    <p:spTree>
+      <p:nvGrpSpPr>
+        <p:cNvPr id="1" name=""/>
+        <p:cNvGrpSpPr/>
+        <p:nvPr/>
+      </p:nvGrpSpPr>
+      <p:grpSpPr>
+        <a:xfrm>
+          <a:off x="0" y="0"/>
+          <a:ext cx="0" cy="0"/>
+          <a:chOff x="0" y="0"/>
+          <a:chExt cx="0" cy="0"/>
+        </a:xfrm>
+      </p:grpSpPr>
+      <p:sp>
+        <p:nvSpPr>
+          <p:cNvPr id="6" name="TextBox 5"/>
+          <p:cNvSpPr txBox="1"/>
+          <p:nvPr/>
+        </p:nvSpPr>
+        <p:spPr>
+          <a:xfrm>
+            <a:off x="1045115" y="611181"/>
+            <a:ext cx="7404953" cy="338554"/>
+          </a:xfrm>
+          <a:prstGeom prst="rect">
+            <a:avLst/>
+          </a:prstGeom>
+          <a:noFill/>
+        </p:spPr>
+        <p:txBody>
+          <a:bodyPr wrap="square" rtlCol="0">
+            <a:spAutoFit/>
+          </a:bodyPr>
+          <a:lstStyle/>
+          <a:p>
+            <a:r>
+              <a:rPr lang="en-US" sz="1600" dirty="0" smtClean="0"/>
+              <a:t>H1 – Bitter 36px font-weight 400 #333, letter-spacing normal, line-height 44px</a:t>
+            </a:r>
+          </a:p>
+        </p:txBody>
+      </p:sp>
+      <p:pic>
+        <p:nvPicPr>
+          <p:cNvPr id="2" name="Picture 1" descr="H1-Glossary.png"/>
+          <p:cNvPicPr>
+            <a:picLocks noChangeAspect="1"/>
+          </p:cNvPicPr>
+          <p:nvPr/>
+        </p:nvPicPr>
+        <p:blipFill>
+          <a:blip r:embed="rId2">
+            <a:extLst>
+              <a:ext uri="{28A0092B-C50C-407E-A947-70E740481C1C}">
+                <a14:useLocalDpi xmlns:a14="http://schemas.microsoft.com/office/drawing/2010/main" val="0"/>
+              </a:ext>
+            </a:extLst>
+          </a:blip>
+          <a:stretch>
+            <a:fillRect/>
+          </a:stretch>
+        </p:blipFill>
+        <p:spPr>
+          <a:xfrm>
+            <a:off x="1045115" y="960146"/>
+            <a:ext cx="1472795" cy="490932"/>
+          </a:xfrm>
+          <a:prstGeom prst="rect">
+            <a:avLst/>
+          </a:prstGeom>
+        </p:spPr>
+      </p:pic>
+      <p:pic>
+        <p:nvPicPr>
+          <p:cNvPr id="3" name="Picture 2" descr="AlphaSelect-Glossary.png"/>
+          <p:cNvPicPr>
+            <a:picLocks noChangeAspect="1"/>
+          </p:cNvPicPr>
+          <p:nvPr/>
+        </p:nvPicPr>
+        <p:blipFill>
+          <a:blip r:embed="rId3">
+            <a:extLst>
+              <a:ext uri="{28A0092B-C50C-407E-A947-70E740481C1C}">
+                <a14:useLocalDpi xmlns:a14="http://schemas.microsoft.com/office/drawing/2010/main" val="0"/>
+              </a:ext>
+            </a:extLst>
+          </a:blip>
+          <a:stretch>
+            <a:fillRect/>
+          </a:stretch>
+        </p:blipFill>
+        <p:spPr>
+          <a:xfrm>
+            <a:off x="1097165" y="2419265"/>
+            <a:ext cx="6949867" cy="422080"/>
+          </a:xfrm>
+          <a:prstGeom prst="rect">
+            <a:avLst/>
+          </a:prstGeom>
+        </p:spPr>
+      </p:pic>
+      <p:sp>
+        <p:nvSpPr>
+          <p:cNvPr id="17" name="TextBox 16"/>
+          <p:cNvSpPr txBox="1"/>
+          <p:nvPr/>
+        </p:nvSpPr>
+        <p:spPr>
+          <a:xfrm>
+            <a:off x="1055525" y="1994744"/>
+            <a:ext cx="7404953" cy="338554"/>
+          </a:xfrm>
+          <a:prstGeom prst="rect">
+            <a:avLst/>
+          </a:prstGeom>
+          <a:noFill/>
+        </p:spPr>
+        <p:txBody>
+          <a:bodyPr wrap="square" rtlCol="0">
+            <a:spAutoFit/>
+          </a:bodyPr>
+          <a:lstStyle/>
+          <a:p>
+            <a:r>
+              <a:rPr lang="en-US" sz="1600" dirty="0" err="1" smtClean="0"/>
+              <a:t>Nav</a:t>
+            </a:r>
+            <a:r>
+              <a:rPr lang="en-US" sz="1600" dirty="0" smtClean="0"/>
+              <a:t> </a:t>
+            </a:r>
+            <a:r>
+              <a:rPr lang="en-US" sz="1600" dirty="0" smtClean="0"/>
+              <a:t>– </a:t>
+            </a:r>
+            <a:r>
+              <a:rPr lang="en-US" sz="1600" dirty="0" smtClean="0"/>
+              <a:t>Open Sans 16px </a:t>
+            </a:r>
+            <a:r>
+              <a:rPr lang="en-US" sz="1600" dirty="0" smtClean="0"/>
+              <a:t>font-weight </a:t>
+            </a:r>
+            <a:r>
+              <a:rPr lang="en-US" sz="1600" dirty="0" smtClean="0"/>
+              <a:t>Bold #0C648C, Rollover #000000, Background #EEE</a:t>
+            </a:r>
+            <a:endParaRPr lang="en-US" sz="1600" dirty="0" smtClean="0"/>
+          </a:p>
+        </p:txBody>
+      </p:sp>
+      <p:sp>
+        <p:nvSpPr>
+          <p:cNvPr id="18" name="TextBox 17"/>
+          <p:cNvSpPr txBox="1"/>
+          <p:nvPr/>
+        </p:nvSpPr>
+        <p:spPr>
+          <a:xfrm>
+            <a:off x="1055525" y="3332690"/>
+            <a:ext cx="8088475" cy="830997"/>
+          </a:xfrm>
+          <a:prstGeom prst="rect">
+            <a:avLst/>
+          </a:prstGeom>
+          <a:noFill/>
+        </p:spPr>
+        <p:txBody>
+          <a:bodyPr wrap="square" rtlCol="0">
+            <a:spAutoFit/>
+          </a:bodyPr>
+          <a:lstStyle/>
+          <a:p>
+            <a:r>
+              <a:rPr lang="en-US" sz="1600" dirty="0" smtClean="0"/>
+              <a:t>Links</a:t>
+            </a:r>
+          </a:p>
+          <a:p>
+            <a:r>
+              <a:rPr lang="en-US" sz="1600" dirty="0" smtClean="0"/>
+              <a:t>H2</a:t>
+            </a:r>
+            <a:r>
+              <a:rPr lang="en-US" sz="1600" dirty="0"/>
+              <a:t> – </a:t>
+            </a:r>
+            <a:r>
+              <a:rPr lang="en-US" sz="1600" dirty="0" smtClean="0"/>
+              <a:t>Bitter 24px font-weight 400 #333, </a:t>
+            </a:r>
+          </a:p>
+          <a:p>
+            <a:r>
+              <a:rPr lang="en-US" sz="1600" dirty="0" smtClean="0"/>
+              <a:t>List </a:t>
+            </a:r>
+            <a:r>
+              <a:rPr lang="en-US" sz="1600" dirty="0"/>
+              <a:t>– </a:t>
+            </a:r>
+            <a:r>
+              <a:rPr lang="en-US" sz="1600" dirty="0" smtClean="0"/>
+              <a:t>Open Sans 16px #0C648C, rollover #08425d underline, </a:t>
+            </a:r>
+            <a:r>
+              <a:rPr lang="en-US" sz="1600" dirty="0"/>
+              <a:t>line-height 24px, </a:t>
+            </a:r>
+            <a:r>
+              <a:rPr lang="en-US" sz="1600" dirty="0" smtClean="0"/>
+              <a:t> </a:t>
+            </a:r>
+            <a:endParaRPr lang="en-US" sz="1600" dirty="0" smtClean="0"/>
+          </a:p>
+        </p:txBody>
+      </p:sp>
+      <p:pic>
+        <p:nvPicPr>
+          <p:cNvPr id="5" name="Picture 4" descr="Links-wRollover-Glossary.png"/>
+          <p:cNvPicPr>
+            <a:picLocks noChangeAspect="1"/>
+          </p:cNvPicPr>
+          <p:nvPr/>
+        </p:nvPicPr>
+        <p:blipFill>
+          <a:blip r:embed="rId4">
+            <a:extLst>
+              <a:ext uri="{28A0092B-C50C-407E-A947-70E740481C1C}">
+                <a14:useLocalDpi xmlns:a14="http://schemas.microsoft.com/office/drawing/2010/main" val="0"/>
+              </a:ext>
+            </a:extLst>
+          </a:blip>
+          <a:stretch>
+            <a:fillRect/>
+          </a:stretch>
+        </p:blipFill>
+        <p:spPr>
+          <a:xfrm>
+            <a:off x="864040" y="4250421"/>
+            <a:ext cx="7849241" cy="2157676"/>
           </a:xfrm>
           <a:prstGeom prst="rect">
             <a:avLst/>
@@ -6703,7 +6865,7 @@
     </p:spTree>
     <p:extLst>
       <p:ext uri="{BB962C8B-B14F-4D97-AF65-F5344CB8AC3E}">
-        <p14:creationId xmlns:p14="http://schemas.microsoft.com/office/powerpoint/2010/main" val="2363415097"/>
+        <p14:creationId xmlns:p14="http://schemas.microsoft.com/office/powerpoint/2010/main" val="1565858908"/>
       </p:ext>
     </p:extLst>
   </p:cSld>
@@ -6844,15 +7006,7 @@
           <a:p>
             <a:r>
               <a:rPr lang="en-US" sz="1600" dirty="0" smtClean="0"/>
-              <a:t>H1 – </a:t>
-            </a:r>
-            <a:r>
-              <a:rPr lang="en-US" sz="1600" dirty="0" smtClean="0"/>
-              <a:t>Open Sans 60px </a:t>
-            </a:r>
-            <a:r>
-              <a:rPr lang="en-US" sz="1600" dirty="0" smtClean="0"/>
-              <a:t>#FFF font-weight 400, letter-spacing -2, line-height 67px</a:t>
+              <a:t>H1 – Open Sans 60px #FFF font-weight 400, letter-spacing -2, line-height 67px</a:t>
             </a:r>
             <a:endParaRPr lang="en-US" sz="1600" dirty="0"/>
           </a:p>
@@ -6882,15 +7036,7 @@
           <a:p>
             <a:r>
               <a:rPr lang="en-US" sz="1600" dirty="0" smtClean="0"/>
-              <a:t>Subhead – </a:t>
-            </a:r>
-            <a:r>
-              <a:rPr lang="en-US" sz="1600" dirty="0" smtClean="0"/>
-              <a:t>Open Sans 18px</a:t>
-            </a:r>
-            <a:r>
-              <a:rPr lang="en-US" sz="1600" dirty="0" smtClean="0"/>
-              <a:t>, letter-spacing 0, line-height 25px</a:t>
+              <a:t>Subhead – Open Sans 18px, letter-spacing 0, line-height 25px</a:t>
             </a:r>
             <a:endParaRPr lang="en-US" sz="1600" dirty="0"/>
           </a:p>
@@ -6920,15 +7066,7 @@
           <a:p>
             <a:r>
               <a:rPr lang="en-US" sz="1600" dirty="0" smtClean="0"/>
-              <a:t>Below Primary CTA – </a:t>
-            </a:r>
-            <a:r>
-              <a:rPr lang="en-US" sz="1600" dirty="0" smtClean="0"/>
-              <a:t>Open Sans 13px </a:t>
-            </a:r>
-            <a:r>
-              <a:rPr lang="en-US" sz="1600" dirty="0" smtClean="0"/>
-              <a:t>#FFF, letter-spacing 0, line-height 18px</a:t>
+              <a:t>Below Primary CTA – Open Sans 13px #FFF, letter-spacing 0, line-height 18px</a:t>
             </a:r>
             <a:endParaRPr lang="en-US" sz="1600" dirty="0"/>
           </a:p>
@@ -6998,6 +7136,568 @@
     <p:extLst>
       <p:ext uri="{BB962C8B-B14F-4D97-AF65-F5344CB8AC3E}">
         <p14:creationId xmlns:p14="http://schemas.microsoft.com/office/powerpoint/2010/main" val="548023342"/>
+      </p:ext>
+    </p:extLst>
+  </p:cSld>
+  <p:clrMapOvr>
+    <a:masterClrMapping/>
+  </p:clrMapOvr>
+</p:sld>
+</file>
+
+<file path=ppt/slides/slide30.xml><?xml version="1.0" encoding="utf-8"?>
+<p:sld xmlns:a="http://schemas.openxmlformats.org/drawingml/2006/main" xmlns:r="http://schemas.openxmlformats.org/officeDocument/2006/relationships" xmlns:p="http://schemas.openxmlformats.org/presentationml/2006/main">
+  <p:cSld>
+    <p:spTree>
+      <p:nvGrpSpPr>
+        <p:cNvPr id="1" name=""/>
+        <p:cNvGrpSpPr/>
+        <p:nvPr/>
+      </p:nvGrpSpPr>
+      <p:grpSpPr>
+        <a:xfrm>
+          <a:off x="0" y="0"/>
+          <a:ext cx="0" cy="0"/>
+          <a:chOff x="0" y="0"/>
+          <a:chExt cx="0" cy="0"/>
+        </a:xfrm>
+      </p:grpSpPr>
+      <p:sp>
+        <p:nvSpPr>
+          <p:cNvPr id="2" name="Title 1"/>
+          <p:cNvSpPr>
+            <a:spLocks noGrp="1"/>
+          </p:cNvSpPr>
+          <p:nvPr>
+            <p:ph type="ctrTitle"/>
+          </p:nvPr>
+        </p:nvSpPr>
+        <p:spPr/>
+        <p:txBody>
+          <a:bodyPr/>
+          <a:lstStyle/>
+          <a:p>
+            <a:r>
+              <a:rPr lang="en-US" dirty="0" smtClean="0"/>
+              <a:t>Modal</a:t>
+            </a:r>
+            <a:endParaRPr lang="en-US" dirty="0"/>
+          </a:p>
+        </p:txBody>
+      </p:sp>
+    </p:spTree>
+    <p:extLst>
+      <p:ext uri="{BB962C8B-B14F-4D97-AF65-F5344CB8AC3E}">
+        <p14:creationId xmlns:p14="http://schemas.microsoft.com/office/powerpoint/2010/main" val="160414887"/>
+      </p:ext>
+    </p:extLst>
+  </p:cSld>
+  <p:clrMapOvr>
+    <a:masterClrMapping/>
+  </p:clrMapOvr>
+</p:sld>
+</file>
+
+<file path=ppt/slides/slide31.xml><?xml version="1.0" encoding="utf-8"?>
+<p:sld xmlns:a="http://schemas.openxmlformats.org/drawingml/2006/main" xmlns:r="http://schemas.openxmlformats.org/officeDocument/2006/relationships" xmlns:p="http://schemas.openxmlformats.org/presentationml/2006/main">
+  <p:cSld>
+    <p:spTree>
+      <p:nvGrpSpPr>
+        <p:cNvPr id="1" name=""/>
+        <p:cNvGrpSpPr/>
+        <p:nvPr/>
+      </p:nvGrpSpPr>
+      <p:grpSpPr>
+        <a:xfrm>
+          <a:off x="0" y="0"/>
+          <a:ext cx="0" cy="0"/>
+          <a:chOff x="0" y="0"/>
+          <a:chExt cx="0" cy="0"/>
+        </a:xfrm>
+      </p:grpSpPr>
+      <p:pic>
+        <p:nvPicPr>
+          <p:cNvPr id="4" name="Picture 3" descr="SignUpModal.png"/>
+          <p:cNvPicPr>
+            <a:picLocks noChangeAspect="1"/>
+          </p:cNvPicPr>
+          <p:nvPr/>
+        </p:nvPicPr>
+        <p:blipFill>
+          <a:blip r:embed="rId2">
+            <a:extLst>
+              <a:ext uri="{28A0092B-C50C-407E-A947-70E740481C1C}">
+                <a14:useLocalDpi xmlns:a14="http://schemas.microsoft.com/office/drawing/2010/main" val="0"/>
+              </a:ext>
+            </a:extLst>
+          </a:blip>
+          <a:stretch>
+            <a:fillRect/>
+          </a:stretch>
+        </p:blipFill>
+        <p:spPr>
+          <a:xfrm>
+            <a:off x="437226" y="1534690"/>
+            <a:ext cx="8269548" cy="4134774"/>
+          </a:xfrm>
+          <a:prstGeom prst="rect">
+            <a:avLst/>
+          </a:prstGeom>
+        </p:spPr>
+      </p:pic>
+    </p:spTree>
+    <p:extLst>
+      <p:ext uri="{BB962C8B-B14F-4D97-AF65-F5344CB8AC3E}">
+        <p14:creationId xmlns:p14="http://schemas.microsoft.com/office/powerpoint/2010/main" val="2243024275"/>
+      </p:ext>
+    </p:extLst>
+  </p:cSld>
+  <p:clrMapOvr>
+    <a:masterClrMapping/>
+  </p:clrMapOvr>
+</p:sld>
+</file>
+
+<file path=ppt/slides/slide32.xml><?xml version="1.0" encoding="utf-8"?>
+<p:sld xmlns:a="http://schemas.openxmlformats.org/drawingml/2006/main" xmlns:r="http://schemas.openxmlformats.org/officeDocument/2006/relationships" xmlns:p="http://schemas.openxmlformats.org/presentationml/2006/main">
+  <p:cSld>
+    <p:spTree>
+      <p:nvGrpSpPr>
+        <p:cNvPr id="1" name=""/>
+        <p:cNvGrpSpPr/>
+        <p:nvPr/>
+      </p:nvGrpSpPr>
+      <p:grpSpPr>
+        <a:xfrm>
+          <a:off x="0" y="0"/>
+          <a:ext cx="0" cy="0"/>
+          <a:chOff x="0" y="0"/>
+          <a:chExt cx="0" cy="0"/>
+        </a:xfrm>
+      </p:grpSpPr>
+      <p:sp>
+        <p:nvSpPr>
+          <p:cNvPr id="6" name="TextBox 5"/>
+          <p:cNvSpPr txBox="1"/>
+          <p:nvPr/>
+        </p:nvSpPr>
+        <p:spPr>
+          <a:xfrm>
+            <a:off x="865823" y="611181"/>
+            <a:ext cx="7404953" cy="338554"/>
+          </a:xfrm>
+          <a:prstGeom prst="rect">
+            <a:avLst/>
+          </a:prstGeom>
+          <a:noFill/>
+        </p:spPr>
+        <p:txBody>
+          <a:bodyPr wrap="square" rtlCol="0">
+            <a:spAutoFit/>
+          </a:bodyPr>
+          <a:lstStyle/>
+          <a:p>
+            <a:r>
+              <a:rPr lang="en-US" sz="1600" dirty="0" smtClean="0"/>
+              <a:t>H1 – Bitter </a:t>
+            </a:r>
+            <a:r>
+              <a:rPr lang="en-US" sz="1600" dirty="0" smtClean="0"/>
+              <a:t>24px </a:t>
+            </a:r>
+            <a:r>
+              <a:rPr lang="en-US" sz="1600" dirty="0" smtClean="0"/>
+              <a:t>font-weight 400 #333, letter-spacing normal, line-height 44px</a:t>
+            </a:r>
+          </a:p>
+        </p:txBody>
+      </p:sp>
+      <p:pic>
+        <p:nvPicPr>
+          <p:cNvPr id="3" name="Picture 2" descr="H1-SignUpModal.png"/>
+          <p:cNvPicPr>
+            <a:picLocks noChangeAspect="1"/>
+          </p:cNvPicPr>
+          <p:nvPr/>
+        </p:nvPicPr>
+        <p:blipFill>
+          <a:blip r:embed="rId2">
+            <a:extLst>
+              <a:ext uri="{28A0092B-C50C-407E-A947-70E740481C1C}">
+                <a14:useLocalDpi xmlns:a14="http://schemas.microsoft.com/office/drawing/2010/main" val="0"/>
+              </a:ext>
+            </a:extLst>
+          </a:blip>
+          <a:stretch>
+            <a:fillRect/>
+          </a:stretch>
+        </p:blipFill>
+        <p:spPr>
+          <a:xfrm>
+            <a:off x="834593" y="1012455"/>
+            <a:ext cx="6241977" cy="439134"/>
+          </a:xfrm>
+          <a:prstGeom prst="rect">
+            <a:avLst/>
+          </a:prstGeom>
+        </p:spPr>
+      </p:pic>
+      <p:sp>
+        <p:nvSpPr>
+          <p:cNvPr id="5" name="TextBox 4"/>
+          <p:cNvSpPr txBox="1"/>
+          <p:nvPr/>
+        </p:nvSpPr>
+        <p:spPr>
+          <a:xfrm>
+            <a:off x="865823" y="1814388"/>
+            <a:ext cx="7404953" cy="338554"/>
+          </a:xfrm>
+          <a:prstGeom prst="rect">
+            <a:avLst/>
+          </a:prstGeom>
+          <a:noFill/>
+        </p:spPr>
+        <p:txBody>
+          <a:bodyPr wrap="square" rtlCol="0">
+            <a:spAutoFit/>
+          </a:bodyPr>
+          <a:lstStyle/>
+          <a:p>
+            <a:r>
+              <a:rPr lang="en-US" sz="1600" dirty="0" smtClean="0"/>
+              <a:t>Text </a:t>
+            </a:r>
+            <a:r>
+              <a:rPr lang="en-US" sz="1600" dirty="0" smtClean="0"/>
+              <a:t>– </a:t>
+            </a:r>
+            <a:r>
+              <a:rPr lang="en-US" sz="1600" dirty="0" smtClean="0"/>
+              <a:t>Open Sans 1.5em </a:t>
+            </a:r>
+            <a:r>
+              <a:rPr lang="en-US" sz="1600" dirty="0" smtClean="0"/>
+              <a:t>font-weight 400 #</a:t>
+            </a:r>
+            <a:r>
+              <a:rPr lang="en-US" sz="1600" dirty="0" smtClean="0"/>
+              <a:t>333, </a:t>
+            </a:r>
+            <a:r>
+              <a:rPr lang="en-US" sz="1600" dirty="0" smtClean="0"/>
+              <a:t>line-height </a:t>
+            </a:r>
+            <a:r>
+              <a:rPr lang="en-US" sz="1600" dirty="0" smtClean="0"/>
+              <a:t>24px</a:t>
+            </a:r>
+            <a:endParaRPr lang="en-US" sz="1600" dirty="0" smtClean="0"/>
+          </a:p>
+        </p:txBody>
+      </p:sp>
+      <p:pic>
+        <p:nvPicPr>
+          <p:cNvPr id="4" name="Picture 3" descr="P-SignUpModal.png"/>
+          <p:cNvPicPr>
+            <a:picLocks noChangeAspect="1"/>
+          </p:cNvPicPr>
+          <p:nvPr/>
+        </p:nvPicPr>
+        <p:blipFill>
+          <a:blip r:embed="rId3">
+            <a:extLst>
+              <a:ext uri="{28A0092B-C50C-407E-A947-70E740481C1C}">
+                <a14:useLocalDpi xmlns:a14="http://schemas.microsoft.com/office/drawing/2010/main" val="0"/>
+              </a:ext>
+            </a:extLst>
+          </a:blip>
+          <a:stretch>
+            <a:fillRect/>
+          </a:stretch>
+        </p:blipFill>
+        <p:spPr>
+          <a:xfrm>
+            <a:off x="880764" y="2152942"/>
+            <a:ext cx="7286507" cy="566353"/>
+          </a:xfrm>
+          <a:prstGeom prst="rect">
+            <a:avLst/>
+          </a:prstGeom>
+        </p:spPr>
+      </p:pic>
+      <p:pic>
+        <p:nvPicPr>
+          <p:cNvPr id="7" name="Picture 6" descr="FormLabel-SignUpModal.png"/>
+          <p:cNvPicPr>
+            <a:picLocks noChangeAspect="1"/>
+          </p:cNvPicPr>
+          <p:nvPr/>
+        </p:nvPicPr>
+        <p:blipFill>
+          <a:blip r:embed="rId4">
+            <a:extLst>
+              <a:ext uri="{28A0092B-C50C-407E-A947-70E740481C1C}">
+                <a14:useLocalDpi xmlns:a14="http://schemas.microsoft.com/office/drawing/2010/main" val="0"/>
+              </a:ext>
+            </a:extLst>
+          </a:blip>
+          <a:stretch>
+            <a:fillRect/>
+          </a:stretch>
+        </p:blipFill>
+        <p:spPr>
+          <a:xfrm>
+            <a:off x="817284" y="3333379"/>
+            <a:ext cx="1442587" cy="342152"/>
+          </a:xfrm>
+          <a:prstGeom prst="rect">
+            <a:avLst/>
+          </a:prstGeom>
+        </p:spPr>
+      </p:pic>
+      <p:sp>
+        <p:nvSpPr>
+          <p:cNvPr id="8" name="TextBox 7"/>
+          <p:cNvSpPr txBox="1"/>
+          <p:nvPr/>
+        </p:nvSpPr>
+        <p:spPr>
+          <a:xfrm>
+            <a:off x="879416" y="2999142"/>
+            <a:ext cx="7404953" cy="338554"/>
+          </a:xfrm>
+          <a:prstGeom prst="rect">
+            <a:avLst/>
+          </a:prstGeom>
+          <a:noFill/>
+        </p:spPr>
+        <p:txBody>
+          <a:bodyPr wrap="square" rtlCol="0">
+            <a:spAutoFit/>
+          </a:bodyPr>
+          <a:lstStyle/>
+          <a:p>
+            <a:r>
+              <a:rPr lang="en-US" sz="1600" dirty="0" smtClean="0"/>
+              <a:t>Form Label </a:t>
+            </a:r>
+            <a:r>
+              <a:rPr lang="en-US" sz="1600" dirty="0" smtClean="0"/>
+              <a:t>– </a:t>
+            </a:r>
+            <a:r>
+              <a:rPr lang="en-US" sz="1600" dirty="0" smtClean="0"/>
+              <a:t>Open Sans</a:t>
+            </a:r>
+            <a:r>
+              <a:rPr lang="en-US" sz="1600" dirty="0" smtClean="0"/>
+              <a:t> 16px </a:t>
+            </a:r>
+            <a:r>
+              <a:rPr lang="en-US" sz="1600" dirty="0" smtClean="0"/>
+              <a:t>font-weight </a:t>
+            </a:r>
+            <a:r>
+              <a:rPr lang="en-US" sz="1600" dirty="0" smtClean="0"/>
+              <a:t>600 #</a:t>
+            </a:r>
+            <a:r>
+              <a:rPr lang="en-US" sz="1600" dirty="0" smtClean="0"/>
+              <a:t>666</a:t>
+            </a:r>
+            <a:r>
+              <a:rPr lang="en-US" sz="1600" dirty="0" smtClean="0"/>
+              <a:t>, </a:t>
+            </a:r>
+            <a:r>
+              <a:rPr lang="en-US" sz="1600" dirty="0" smtClean="0"/>
+              <a:t>line-height </a:t>
+            </a:r>
+            <a:r>
+              <a:rPr lang="en-US" sz="1600" dirty="0" smtClean="0"/>
+              <a:t>24px</a:t>
+            </a:r>
+            <a:endParaRPr lang="en-US" sz="1600" dirty="0" smtClean="0"/>
+          </a:p>
+        </p:txBody>
+      </p:sp>
+      <p:pic>
+        <p:nvPicPr>
+          <p:cNvPr id="9" name="Picture 8" descr="FormField-SignUpModal.png"/>
+          <p:cNvPicPr>
+            <a:picLocks noChangeAspect="1"/>
+          </p:cNvPicPr>
+          <p:nvPr/>
+        </p:nvPicPr>
+        <p:blipFill>
+          <a:blip r:embed="rId5">
+            <a:extLst>
+              <a:ext uri="{28A0092B-C50C-407E-A947-70E740481C1C}">
+                <a14:useLocalDpi xmlns:a14="http://schemas.microsoft.com/office/drawing/2010/main" val="0"/>
+              </a:ext>
+            </a:extLst>
+          </a:blip>
+          <a:stretch>
+            <a:fillRect/>
+          </a:stretch>
+        </p:blipFill>
+        <p:spPr>
+          <a:xfrm>
+            <a:off x="906930" y="4447828"/>
+            <a:ext cx="4415727" cy="572409"/>
+          </a:xfrm>
+          <a:prstGeom prst="rect">
+            <a:avLst/>
+          </a:prstGeom>
+        </p:spPr>
+      </p:pic>
+      <p:sp>
+        <p:nvSpPr>
+          <p:cNvPr id="10" name="TextBox 9"/>
+          <p:cNvSpPr txBox="1"/>
+          <p:nvPr/>
+        </p:nvSpPr>
+        <p:spPr>
+          <a:xfrm>
+            <a:off x="880764" y="4079392"/>
+            <a:ext cx="7404953" cy="338554"/>
+          </a:xfrm>
+          <a:prstGeom prst="rect">
+            <a:avLst/>
+          </a:prstGeom>
+          <a:noFill/>
+        </p:spPr>
+        <p:txBody>
+          <a:bodyPr wrap="square" rtlCol="0">
+            <a:spAutoFit/>
+          </a:bodyPr>
+          <a:lstStyle/>
+          <a:p>
+            <a:r>
+              <a:rPr lang="en-US" sz="1600" dirty="0" smtClean="0"/>
+              <a:t>Form Field </a:t>
+            </a:r>
+            <a:r>
+              <a:rPr lang="en-US" sz="1600" dirty="0" smtClean="0"/>
+              <a:t>– </a:t>
+            </a:r>
+            <a:r>
+              <a:rPr lang="en-US" sz="1600" dirty="0" smtClean="0"/>
+              <a:t>Open Sans</a:t>
+            </a:r>
+            <a:r>
+              <a:rPr lang="en-US" sz="1600" dirty="0" smtClean="0"/>
+              <a:t> 1.5em </a:t>
+            </a:r>
+            <a:r>
+              <a:rPr lang="en-US" sz="1600" dirty="0" smtClean="0"/>
+              <a:t>font-weight </a:t>
+            </a:r>
+            <a:r>
+              <a:rPr lang="en-US" sz="1600" dirty="0" smtClean="0"/>
+              <a:t>normal #</a:t>
+            </a:r>
+            <a:r>
+              <a:rPr lang="en-US" sz="1600" dirty="0" smtClean="0"/>
+              <a:t>000</a:t>
+            </a:r>
+            <a:r>
+              <a:rPr lang="en-US" sz="1600" dirty="0" smtClean="0"/>
+              <a:t>, Border-color #EEE </a:t>
+            </a:r>
+            <a:endParaRPr lang="en-US" sz="1600" dirty="0" smtClean="0"/>
+          </a:p>
+        </p:txBody>
+      </p:sp>
+      <p:pic>
+        <p:nvPicPr>
+          <p:cNvPr id="11" name="Picture 10" descr="Button-SignUpModal.png"/>
+          <p:cNvPicPr>
+            <a:picLocks noChangeAspect="1"/>
+          </p:cNvPicPr>
+          <p:nvPr/>
+        </p:nvPicPr>
+        <p:blipFill>
+          <a:blip r:embed="rId6">
+            <a:extLst>
+              <a:ext uri="{28A0092B-C50C-407E-A947-70E740481C1C}">
+                <a14:useLocalDpi xmlns:a14="http://schemas.microsoft.com/office/drawing/2010/main" val="0"/>
+              </a:ext>
+            </a:extLst>
+          </a:blip>
+          <a:stretch>
+            <a:fillRect/>
+          </a:stretch>
+        </p:blipFill>
+        <p:spPr>
+          <a:xfrm>
+            <a:off x="787402" y="5621142"/>
+            <a:ext cx="1479176" cy="647140"/>
+          </a:xfrm>
+          <a:prstGeom prst="rect">
+            <a:avLst/>
+          </a:prstGeom>
+        </p:spPr>
+      </p:pic>
+      <p:sp>
+        <p:nvSpPr>
+          <p:cNvPr id="12" name="TextBox 11"/>
+          <p:cNvSpPr txBox="1"/>
+          <p:nvPr/>
+        </p:nvSpPr>
+        <p:spPr>
+          <a:xfrm>
+            <a:off x="865823" y="5342352"/>
+            <a:ext cx="7740297" cy="338554"/>
+          </a:xfrm>
+          <a:prstGeom prst="rect">
+            <a:avLst/>
+          </a:prstGeom>
+          <a:noFill/>
+        </p:spPr>
+        <p:txBody>
+          <a:bodyPr wrap="square" rtlCol="0">
+            <a:spAutoFit/>
+          </a:bodyPr>
+          <a:lstStyle/>
+          <a:p>
+            <a:r>
+              <a:rPr lang="en-US" sz="1600" dirty="0" smtClean="0"/>
+              <a:t>Button – </a:t>
+            </a:r>
+            <a:r>
+              <a:rPr lang="en-US" sz="1600" dirty="0" smtClean="0"/>
+              <a:t>Open Sans</a:t>
+            </a:r>
+            <a:r>
+              <a:rPr lang="en-US" sz="1600" dirty="0" smtClean="0"/>
+              <a:t> 16px </a:t>
+            </a:r>
+            <a:r>
+              <a:rPr lang="en-US" sz="1600" dirty="0" smtClean="0"/>
+              <a:t>font-</a:t>
+            </a:r>
+            <a:r>
+              <a:rPr lang="en-US" sz="1600" dirty="0" smtClean="0"/>
+              <a:t>weight 700 #</a:t>
+            </a:r>
+            <a:r>
+              <a:rPr lang="en-US" sz="1600" dirty="0" smtClean="0"/>
+              <a:t>FFF</a:t>
+            </a:r>
+            <a:r>
+              <a:rPr lang="en-US" sz="1600" dirty="0" smtClean="0"/>
+              <a:t>, Background #12890E, Rollover #0F720C </a:t>
+            </a:r>
+            <a:endParaRPr lang="en-US" sz="1600" dirty="0" smtClean="0"/>
+          </a:p>
+        </p:txBody>
+      </p:sp>
+    </p:spTree>
+    <p:extLst>
+      <p:ext uri="{BB962C8B-B14F-4D97-AF65-F5344CB8AC3E}">
+        <p14:creationId xmlns:p14="http://schemas.microsoft.com/office/powerpoint/2010/main" val="2297023534"/>
       </p:ext>
     </p:extLst>
   </p:cSld>
@@ -7161,15 +7861,7 @@
           <a:p>
             <a:r>
               <a:rPr lang="en-US" sz="1600" dirty="0" smtClean="0"/>
-              <a:t>Button Rollover – </a:t>
-            </a:r>
-            <a:r>
-              <a:rPr lang="en-US" sz="1600" dirty="0" smtClean="0"/>
-              <a:t>Open Sans 20px </a:t>
-            </a:r>
-            <a:r>
-              <a:rPr lang="en-US" sz="1600" dirty="0" smtClean="0"/>
-              <a:t>Bold #FFF, background </a:t>
+              <a:t>Button Rollover – Open Sans 20px Bold #FFF, background </a:t>
             </a:r>
             <a:r>
               <a:rPr lang="de-DE" sz="1600" dirty="0" smtClean="0"/>
@@ -7297,15 +7989,7 @@
           <a:p>
             <a:r>
               <a:rPr lang="en-US" sz="1600" dirty="0" smtClean="0"/>
-              <a:t>Dropdown – </a:t>
-            </a:r>
-            <a:r>
-              <a:rPr lang="en-US" sz="1600" dirty="0" smtClean="0"/>
-              <a:t>Open Sans 1.5em </a:t>
-            </a:r>
-            <a:r>
-              <a:rPr lang="en-US" sz="1600" dirty="0" smtClean="0"/>
-              <a:t>#555, dropdown height 44px, background #EEE</a:t>
+              <a:t>Dropdown – Open Sans 1.5em #555, dropdown height 44px, background #EEE</a:t>
             </a:r>
             <a:endParaRPr lang="en-US" sz="1600" dirty="0"/>
           </a:p>
@@ -7448,15 +8132,7 @@
           <a:p>
             <a:r>
               <a:rPr lang="en-US" sz="1600" dirty="0" smtClean="0"/>
-              <a:t>H1 – </a:t>
-            </a:r>
-            <a:r>
-              <a:rPr lang="en-US" sz="1600" dirty="0" smtClean="0"/>
-              <a:t>Bitter 36px </a:t>
-            </a:r>
-            <a:r>
-              <a:rPr lang="en-US" sz="1600" dirty="0" smtClean="0"/>
-              <a:t>#FFF font-weight 400, letter-spacing normal, line-height 44px</a:t>
+              <a:t>H1 – Bitter 36px #FFF font-weight 400, letter-spacing normal, line-height 44px</a:t>
             </a:r>
             <a:endParaRPr lang="en-US" sz="1600" dirty="0"/>
           </a:p>
@@ -7546,15 +8222,7 @@
           <a:p>
             <a:r>
               <a:rPr lang="en-US" sz="1600" dirty="0" smtClean="0"/>
-              <a:t>Paragraph – </a:t>
-            </a:r>
-            <a:r>
-              <a:rPr lang="en-US" sz="1600" dirty="0" smtClean="0"/>
-              <a:t>Open Sans 16px </a:t>
-            </a:r>
-            <a:r>
-              <a:rPr lang="en-US" sz="1600" dirty="0" smtClean="0"/>
-              <a:t>#FFF, line-height 24px</a:t>
+              <a:t>Paragraph – Open Sans 16px #FFF, line-height 24px</a:t>
             </a:r>
           </a:p>
           <a:p>
@@ -7682,15 +8350,7 @@
           <a:p>
             <a:r>
               <a:rPr lang="en-US" sz="1600" dirty="0" smtClean="0"/>
-              <a:t>H2 – </a:t>
-            </a:r>
-            <a:r>
-              <a:rPr lang="en-US" sz="1600" dirty="0" smtClean="0"/>
-              <a:t>Bitter 35px </a:t>
-            </a:r>
-            <a:r>
-              <a:rPr lang="en-US" sz="1600" dirty="0" smtClean="0"/>
-              <a:t>#333 font-weight 400, letter-spacing normal, line-height 32px</a:t>
+              <a:t>H2 – Bitter 35px #333 font-weight 400, letter-spacing normal, line-height 32px</a:t>
             </a:r>
             <a:endParaRPr lang="en-US" sz="1600" dirty="0"/>
           </a:p>
@@ -7720,15 +8380,7 @@
           <a:p>
             <a:r>
               <a:rPr lang="en-US" sz="1600" dirty="0" smtClean="0"/>
-              <a:t>H3 – </a:t>
-            </a:r>
-            <a:r>
-              <a:rPr lang="en-US" sz="1600" dirty="0" smtClean="0"/>
-              <a:t>Bitter 21px </a:t>
-            </a:r>
-            <a:r>
-              <a:rPr lang="en-US" sz="1600" dirty="0" smtClean="0"/>
-              <a:t>#666 font-weight 400, letter-spacing normal, line-height 25px</a:t>
+              <a:t>H3 – Bitter 21px #666 font-weight 400, letter-spacing normal, line-height 25px</a:t>
             </a:r>
           </a:p>
           <a:p>
@@ -7794,31 +8446,7 @@
           <a:p>
             <a:r>
               <a:rPr lang="en-US" sz="1600" dirty="0" smtClean="0"/>
-              <a:t>List </a:t>
-            </a:r>
-            <a:r>
-              <a:rPr lang="en-US" sz="1600" dirty="0" smtClean="0"/>
-              <a:t>– </a:t>
-            </a:r>
-            <a:r>
-              <a:rPr lang="en-US" sz="1600" dirty="0" smtClean="0"/>
-              <a:t>Open Sans 16px #0C648C </a:t>
-            </a:r>
-            <a:r>
-              <a:rPr lang="en-US" sz="1600" dirty="0" smtClean="0"/>
-              <a:t>font-weight 400, </a:t>
-            </a:r>
-            <a:r>
-              <a:rPr lang="en-US" sz="1600" dirty="0" smtClean="0"/>
-              <a:t>text decoration underline, </a:t>
-            </a:r>
-            <a:r>
-              <a:rPr lang="en-US" sz="1600" dirty="0" smtClean="0"/>
-              <a:t>line-height </a:t>
-            </a:r>
-            <a:r>
-              <a:rPr lang="en-US" sz="1600" dirty="0" smtClean="0"/>
-              <a:t>24px</a:t>
+              <a:t>List – Open Sans 16px #0C648C font-weight 400, text decoration underline, line-height 24px</a:t>
             </a:r>
             <a:endParaRPr lang="en-US" sz="1600" dirty="0"/>
           </a:p>
@@ -7877,25 +8505,6 @@
           </a:p>
         </p:txBody>
       </p:sp>
-      <p:sp>
-        <p:nvSpPr>
-          <p:cNvPr id="3" name="Subtitle 2"/>
-          <p:cNvSpPr>
-            <a:spLocks noGrp="1"/>
-          </p:cNvSpPr>
-          <p:nvPr>
-            <p:ph type="subTitle" idx="1"/>
-          </p:nvPr>
-        </p:nvSpPr>
-        <p:spPr/>
-        <p:txBody>
-          <a:bodyPr/>
-          <a:lstStyle/>
-          <a:p>
-            <a:endParaRPr lang="en-US"/>
-          </a:p>
-        </p:txBody>
-      </p:sp>
     </p:spTree>
     <p:extLst>
       <p:ext uri="{BB962C8B-B14F-4D97-AF65-F5344CB8AC3E}">
@@ -7992,15 +8601,7 @@
           <a:p>
             <a:r>
               <a:rPr lang="en-US" sz="1600" dirty="0" smtClean="0"/>
-              <a:t>Title – </a:t>
-            </a:r>
-            <a:r>
-              <a:rPr lang="en-US" sz="1600" dirty="0" smtClean="0"/>
-              <a:t>Open Sans 26px </a:t>
-            </a:r>
-            <a:r>
-              <a:rPr lang="en-US" sz="1600" dirty="0" smtClean="0"/>
-              <a:t>#FFF, font-weight: bold, letter-spacing -1px</a:t>
+              <a:t>Title – Open Sans 26px #FFF, font-weight: bold, letter-spacing -1px</a:t>
             </a:r>
             <a:endParaRPr lang="en-US" sz="1600" dirty="0"/>
           </a:p>
@@ -8034,11 +8635,7 @@
             </a:r>
             <a:r>
               <a:rPr lang="en-US" sz="1600" dirty="0" smtClean="0"/>
-              <a:t>Open Sans 20px </a:t>
-            </a:r>
-            <a:r>
-              <a:rPr lang="en-US" sz="1600" dirty="0" smtClean="0"/>
-              <a:t>Bold #FFF, background </a:t>
+              <a:t>Open Sans 20px Bold #FFF, background </a:t>
             </a:r>
             <a:r>
               <a:rPr lang="en-US" sz="1600" dirty="0"/>

</xml_diff>